<commit_message>
Update Project-Final Presentation-CS4267-Parker Smith.pptx
</commit_message>
<xml_diff>
--- a/Project-Final Presentation-CS4267-Parker Smith.pptx
+++ b/Project-Final Presentation-CS4267-Parker Smith.pptx
@@ -4861,7 +4861,15 @@
             </a:r>
             <a:r>
               <a:rPr lang="en-US" dirty="0"/>
-              <a:t>, and Varun Naya [2].</a:t>
+              <a:t>, and Varun Naya [2]. </a:t>
+            </a:r>
+            <a:r>
+              <a:rPr lang="en-US" dirty="0">
+                <a:highlight>
+                  <a:srgbClr val="FFFF00"/>
+                </a:highlight>
+              </a:rPr>
+              <a:t>MORE INFO ABOUT WHY THE BASELINE IS BAD</a:t>
             </a:r>
           </a:p>
           <a:p>
@@ -4952,9 +4960,16 @@
             <p:ph type="title"/>
           </p:nvPr>
         </p:nvSpPr>
-        <p:spPr/>
-        <p:txBody>
-          <a:bodyPr/>
+        <p:spPr>
+          <a:xfrm>
+            <a:off x="1097280" y="286603"/>
+            <a:ext cx="10058400" cy="1450757"/>
+          </a:xfrm>
+        </p:spPr>
+        <p:txBody>
+          <a:bodyPr anchor="b">
+            <a:normAutofit/>
+          </a:bodyPr>
           <a:lstStyle/>
           <a:p>
             <a:r>
@@ -4977,49 +4992,75 @@
             <a:spLocks noGrp="1"/>
           </p:cNvSpPr>
           <p:nvPr>
-            <p:ph idx="1"/>
-          </p:nvPr>
-        </p:nvSpPr>
-        <p:spPr/>
-        <p:txBody>
-          <a:bodyPr/>
-          <a:lstStyle/>
-          <a:p>
+            <p:ph sz="half" idx="1"/>
+          </p:nvPr>
+        </p:nvSpPr>
+        <p:spPr>
+          <a:xfrm>
+            <a:off x="1097280" y="2120900"/>
+            <a:ext cx="4639736" cy="3748193"/>
+          </a:xfrm>
+        </p:spPr>
+        <p:txBody>
+          <a:bodyPr>
+            <a:normAutofit/>
+          </a:bodyPr>
+          <a:lstStyle/>
+          <a:p>
+            <a:pPr>
+              <a:lnSpc>
+                <a:spcPct val="100000"/>
+              </a:lnSpc>
+            </a:pPr>
             <a:r>
               <a:rPr lang="en-US" dirty="0"/>
-              <a:t>The dataset chosen for this project from Kaggle included X factors: X, X, and X.</a:t>
-            </a:r>
-          </a:p>
-          <a:p>
+              <a:t>The dataset chosen for this project from Kaggle included 4 continuous factors and 12 categorical factors, the most important include the vehicle’s year, make, body style, transmission, condition, odometer reading, and selling price.</a:t>
+            </a:r>
+          </a:p>
+          <a:p>
+            <a:pPr>
+              <a:lnSpc>
+                <a:spcPct val="100000"/>
+              </a:lnSpc>
+            </a:pPr>
             <a:r>
               <a:rPr lang="en-US" dirty="0"/>
-              <a:t>Once the dataset was selected, I had to preprocess the data to remove outliers and clean up unnecessary factors. The frequency of the data, after preprocessing, is shown in the image [below/to the right/</a:t>
-            </a:r>
-            <a:r>
-              <a:rPr lang="en-US" dirty="0" err="1"/>
-              <a:t>etc</a:t>
-            </a:r>
-            <a:r>
-              <a:rPr lang="en-US" dirty="0"/>
-              <a:t>].</a:t>
-            </a:r>
-          </a:p>
-          <a:p>
-            <a:r>
-              <a:rPr lang="en-US" dirty="0"/>
-              <a:t>Talk about </a:t>
-            </a:r>
-            <a:r>
-              <a:rPr lang="en-US" dirty="0" err="1"/>
-              <a:t>OneHotEncoding</a:t>
-            </a:r>
-            <a:r>
-              <a:rPr lang="en-US" dirty="0"/>
-              <a:t>.</a:t>
-            </a:r>
-          </a:p>
-        </p:txBody>
-      </p:sp>
+              <a:t>Once the dataset was selected, I had to preprocess the data to remove outliers and clean up unnecessary factors.</a:t>
+            </a:r>
+          </a:p>
+        </p:txBody>
+      </p:sp>
+      <p:pic>
+        <p:nvPicPr>
+          <p:cNvPr id="5" name="Picture 4" descr="Chart, histogram&#10;&#10;Description automatically generated">
+            <a:extLst>
+              <a:ext uri="{FF2B5EF4-FFF2-40B4-BE49-F238E27FC236}">
+                <a16:creationId xmlns:a16="http://schemas.microsoft.com/office/drawing/2014/main" id="{D4F322BD-B9C0-48EE-B8BE-8380B4648D29}"/>
+              </a:ext>
+            </a:extLst>
+          </p:cNvPr>
+          <p:cNvPicPr>
+            <a:picLocks noChangeAspect="1"/>
+          </p:cNvPicPr>
+          <p:nvPr/>
+        </p:nvPicPr>
+        <p:blipFill>
+          <a:blip r:embed="rId2"/>
+          <a:stretch>
+            <a:fillRect/>
+          </a:stretch>
+        </p:blipFill>
+        <p:spPr>
+          <a:xfrm>
+            <a:off x="6515944" y="2255096"/>
+            <a:ext cx="4639736" cy="3479802"/>
+          </a:xfrm>
+          <a:prstGeom prst="rect">
+            <a:avLst/>
+          </a:prstGeom>
+          <a:noFill/>
+        </p:spPr>
+      </p:pic>
     </p:spTree>
     <p:extLst>
       <p:ext uri="{BB962C8B-B14F-4D97-AF65-F5344CB8AC3E}">
@@ -5066,9 +5107,16 @@
             <p:ph type="title"/>
           </p:nvPr>
         </p:nvSpPr>
-        <p:spPr/>
-        <p:txBody>
-          <a:bodyPr/>
+        <p:spPr>
+          <a:xfrm>
+            <a:off x="1097280" y="286603"/>
+            <a:ext cx="10058400" cy="1450757"/>
+          </a:xfrm>
+        </p:spPr>
+        <p:txBody>
+          <a:bodyPr anchor="b">
+            <a:normAutofit/>
+          </a:bodyPr>
           <a:lstStyle/>
           <a:p>
             <a:r>
@@ -5091,21 +5139,73 @@
             <a:spLocks noGrp="1"/>
           </p:cNvSpPr>
           <p:nvPr>
-            <p:ph idx="1"/>
-          </p:nvPr>
-        </p:nvSpPr>
-        <p:spPr/>
-        <p:txBody>
-          <a:bodyPr/>
+            <p:ph sz="half" idx="1"/>
+          </p:nvPr>
+        </p:nvSpPr>
+        <p:spPr>
+          <a:xfrm>
+            <a:off x="1097280" y="2120900"/>
+            <a:ext cx="4639736" cy="3748193"/>
+          </a:xfrm>
+        </p:spPr>
+        <p:txBody>
+          <a:bodyPr>
+            <a:normAutofit/>
+          </a:bodyPr>
           <a:lstStyle/>
           <a:p>
             <a:r>
               <a:rPr lang="en-US" dirty="0"/>
-              <a:t>Slide about Linearity with 2 images here.</a:t>
-            </a:r>
-          </a:p>
-        </p:txBody>
-      </p:sp>
+              <a:t>After preprocessing the data, the categorical features were encoded using the </a:t>
+            </a:r>
+            <a:r>
+              <a:rPr lang="en-US" dirty="0" err="1"/>
+              <a:t>OneHotEncoding</a:t>
+            </a:r>
+            <a:r>
+              <a:rPr lang="en-US" dirty="0"/>
+              <a:t> scheme. This translates categories into binary features and overall adds more features to the dataset.</a:t>
+            </a:r>
+          </a:p>
+          <a:p>
+            <a:r>
+              <a:rPr lang="en-US" dirty="0"/>
+              <a:t>Finally, before testing, I determined the linearity of the dataset’s features by comparing several of the continuous features to the sale price.</a:t>
+            </a:r>
+          </a:p>
+        </p:txBody>
+      </p:sp>
+      <p:pic>
+        <p:nvPicPr>
+          <p:cNvPr id="9" name="Picture 8" descr="Chart, bar chart&#10;&#10;Description automatically generated">
+            <a:extLst>
+              <a:ext uri="{FF2B5EF4-FFF2-40B4-BE49-F238E27FC236}">
+                <a16:creationId xmlns:a16="http://schemas.microsoft.com/office/drawing/2014/main" id="{919E047D-B947-461E-A52D-EEC7639A53F8}"/>
+              </a:ext>
+            </a:extLst>
+          </p:cNvPr>
+          <p:cNvPicPr>
+            <a:picLocks noChangeAspect="1"/>
+          </p:cNvPicPr>
+          <p:nvPr/>
+        </p:nvPicPr>
+        <p:blipFill>
+          <a:blip r:embed="rId2"/>
+          <a:stretch>
+            <a:fillRect/>
+          </a:stretch>
+        </p:blipFill>
+        <p:spPr>
+          <a:xfrm>
+            <a:off x="6515944" y="2255096"/>
+            <a:ext cx="4639736" cy="3479802"/>
+          </a:xfrm>
+          <a:prstGeom prst="rect">
+            <a:avLst/>
+          </a:prstGeom>
+          <a:noFill/>
+        </p:spPr>
+      </p:pic>
     </p:spTree>
     <p:extLst>
       <p:ext uri="{BB962C8B-B14F-4D97-AF65-F5344CB8AC3E}">
@@ -5189,8 +5289,31 @@
           <a:p>
             <a:r>
               <a:rPr lang="en-US" dirty="0"/>
-              <a:t>Slide about the Linear Regression model.</a:t>
-            </a:r>
+              <a:t>The first model I chose, due to the high linearity of the data, was a Multiple Linear Regression model.</a:t>
+            </a:r>
+          </a:p>
+          <a:p>
+            <a:r>
+              <a:rPr lang="en-US" dirty="0"/>
+              <a:t>Using 4 continuous features and 8 categorical features, the Linear Regression model ran with a 90% training and 10% testing split on a single epoch.</a:t>
+            </a:r>
+          </a:p>
+          <a:p>
+            <a:r>
+              <a:rPr lang="en-US" dirty="0"/>
+              <a:t>The accuracy of the model is measured using R</a:t>
+            </a:r>
+            <a:r>
+              <a:rPr lang="en-US" baseline="30000" dirty="0"/>
+              <a:t>2</a:t>
+            </a:r>
+            <a:r>
+              <a:rPr lang="en-US" dirty="0"/>
+              <a:t> accuracy, MSE, RMSE, and training time.</a:t>
+            </a:r>
+          </a:p>
+          <a:p>
+            <a:endParaRPr lang="en-US" dirty="0"/>
           </a:p>
         </p:txBody>
       </p:sp>
@@ -5277,7 +5400,39 @@
           <a:p>
             <a:r>
               <a:rPr lang="en-US" dirty="0"/>
-              <a:t>Slide about the SVM model.</a:t>
+              <a:t>The second model I chose, due to its heavy use in machine learning, was a linear SVM model.</a:t>
+            </a:r>
+          </a:p>
+          <a:p>
+            <a:r>
+              <a:rPr lang="en-US" dirty="0"/>
+              <a:t>This model also used 4 continuous features and 8 categorical features like the Linear Regression model. It ran with a 90% training and 10% testing split.</a:t>
+            </a:r>
+          </a:p>
+          <a:p>
+            <a:r>
+              <a:rPr lang="en-US" dirty="0"/>
+              <a:t>The SVM model used a linear kernel to emulate linear regression, the tolerance value for the SVM was set to be .075.</a:t>
+            </a:r>
+          </a:p>
+          <a:p>
+            <a:r>
+              <a:rPr lang="en-US" dirty="0"/>
+              <a:t>Finally, before any data was inputted to the SVM, it had to be standardized to be between -1 and 1.</a:t>
+            </a:r>
+          </a:p>
+          <a:p>
+            <a:r>
+              <a:rPr lang="en-US" dirty="0"/>
+              <a:t>The accuracy of the model is measured using R</a:t>
+            </a:r>
+            <a:r>
+              <a:rPr lang="en-US" baseline="30000" dirty="0"/>
+              <a:t>2</a:t>
+            </a:r>
+            <a:r>
+              <a:rPr lang="en-US" dirty="0"/>
+              <a:t> accuracy, MSE, RMSE, and training time.</a:t>
             </a:r>
           </a:p>
         </p:txBody>

</xml_diff>